<commit_message>
Update test automation & Digital QA Summit #TAS19.pptx
</commit_message>
<xml_diff>
--- a/test automation & Digital QA Summit #TAS19.pptx
+++ b/test automation & Digital QA Summit #TAS19.pptx
@@ -7943,11 +7943,11 @@
                 <a:cs typeface="Courier New"/>
                 <a:sym typeface="Courier New"/>
               </a:rPr>
-              <a:t>param =&gt; x</a:t>
-            </a:r>
-            <a:r>
-              <a:rPr lang="en"/>
-              <a:t>				</a:t>
+              <a:t>inputParam =&gt; x</a:t>
+            </a:r>
+            <a:r>
+              <a:rPr lang="en"/>
+              <a:t>		</a:t>
             </a:r>
             <a:r>
               <a:rPr i="1" lang="en" sz="1400"/>
@@ -9484,8 +9484,8 @@
         </p:blipFill>
         <p:spPr>
           <a:xfrm>
-            <a:off x="1790700" y="1508350"/>
-            <a:ext cx="5562600" cy="2438400"/>
+            <a:off x="1519238" y="1444400"/>
+            <a:ext cx="5038725" cy="2466975"/>
           </a:xfrm>
           <a:prstGeom prst="rect">
             <a:avLst/>
@@ -13739,7 +13739,7 @@
             </a:pPr>
             <a:r>
               <a:rPr lang="en"/>
-              <a:t>implementation</a:t>
+              <a:t>implementation (User class)</a:t>
             </a:r>
             <a:endParaRPr/>
           </a:p>
@@ -15272,7 +15272,7 @@
             </a:pPr>
             <a:r>
               <a:rPr lang="en"/>
-              <a:t>With </a:t>
+              <a:t>Without </a:t>
             </a:r>
             <a:r>
               <a:rPr lang="en"/>
@@ -16681,7 +16681,7 @@
             </a:pPr>
             <a:r>
               <a:rPr lang="en"/>
-              <a:t>{{host}} = </a:t>
+              <a:t>{{hostURL}} = </a:t>
             </a:r>
             <a:r>
               <a:rPr lang="en" u="sng">

</xml_diff>